<commit_message>
presentation now includes code examples and rough timeline
</commit_message>
<xml_diff>
--- a/presentation/presentation.pptx
+++ b/presentation/presentation.pptx
@@ -13,6 +13,9 @@
     <p:sldId id="258" r:id="rId10"/>
     <p:sldId id="259" r:id="rId11"/>
     <p:sldId id="260" r:id="rId12"/>
+    <p:sldId id="261" r:id="rId13"/>
+    <p:sldId id="262" r:id="rId14"/>
+    <p:sldId id="263" r:id="rId15"/>
   </p:sldIdLst>
   <p:sldSz cx="13004800" cy="9753600"/>
   <p:notesSz cx="6858000" cy="9144000"/>
@@ -2128,7 +2131,7 @@
             </a:pPr>
             <a:r>
               <a:rPr sz="8000"/>
-              <a:t>Workflow</a:t>
+              <a:t>Benchmarks</a:t>
             </a:r>
           </a:p>
         </p:txBody>
@@ -2150,32 +2153,106 @@
           <a:bodyPr/>
           <a:lstStyle/>
           <a:p>
-            <a:pPr lvl="0">
-              <a:defRPr sz="1800"/>
-            </a:pPr>
-            <a:r>
-              <a:rPr sz="3400"/>
-              <a:t>Github</a:t>
-            </a:r>
-            <a:endParaRPr sz="3400"/>
-          </a:p>
-          <a:p>
-            <a:pPr lvl="0">
-              <a:defRPr sz="1800"/>
-            </a:pPr>
-            <a:r>
-              <a:rPr sz="3400"/>
-              <a:t>Focus on automation and incremental implementation</a:t>
-            </a:r>
-            <a:endParaRPr sz="3400"/>
-          </a:p>
-          <a:p>
-            <a:pPr lvl="0">
-              <a:defRPr sz="1800"/>
-            </a:pPr>
-            <a:r>
-              <a:rPr sz="3400"/>
-              <a:t>Issue -&gt; Implement on dev. branch -&gt; Push -&gt; Merge</a:t>
+            <a:pPr lvl="0" marL="333375" indent="-333375" defTabSz="438150">
+              <a:spcBef>
+                <a:spcPts val="3100"/>
+              </a:spcBef>
+              <a:defRPr sz="1800"/>
+            </a:pPr>
+            <a:r>
+              <a:rPr b="1" sz="2550"/>
+              <a:t>Sequential</a:t>
+            </a:r>
+            <a:endParaRPr b="1" sz="2550"/>
+          </a:p>
+          <a:p>
+            <a:pPr lvl="1" marL="666750" indent="-333375" defTabSz="438150">
+              <a:spcBef>
+                <a:spcPts val="3100"/>
+              </a:spcBef>
+              <a:defRPr sz="1800"/>
+            </a:pPr>
+            <a:r>
+              <a:rPr sz="2250"/>
+              <a:t>Binary search, bubble sort, gcd/lcm, matrix multiplication</a:t>
+            </a:r>
+            <a:endParaRPr sz="2250"/>
+          </a:p>
+          <a:p>
+            <a:pPr lvl="0" marL="333375" indent="-333375" defTabSz="438150">
+              <a:spcBef>
+                <a:spcPts val="3100"/>
+              </a:spcBef>
+              <a:defRPr sz="1800"/>
+            </a:pPr>
+            <a:r>
+              <a:rPr b="1" sz="2550"/>
+              <a:t>Micro</a:t>
+            </a:r>
+            <a:endParaRPr b="1" sz="2550"/>
+          </a:p>
+          <a:p>
+            <a:pPr lvl="1" marL="666750" indent="-333375" defTabSz="438150">
+              <a:spcBef>
+                <a:spcPts val="3100"/>
+              </a:spcBef>
+              <a:defRPr sz="1800"/>
+            </a:pPr>
+            <a:r>
+              <a:rPr sz="2250"/>
+              <a:t>Broadcast, multiplex, ping, ping-pong</a:t>
+            </a:r>
+            <a:endParaRPr b="1" sz="2250"/>
+          </a:p>
+          <a:p>
+            <a:pPr lvl="0" marL="294154" indent="-294154" defTabSz="438150">
+              <a:spcBef>
+                <a:spcPts val="3100"/>
+              </a:spcBef>
+              <a:defRPr sz="1800"/>
+            </a:pPr>
+            <a:r>
+              <a:rPr b="1" sz="2550"/>
+              <a:t>Component</a:t>
+            </a:r>
+            <a:endParaRPr b="1" sz="2550"/>
+          </a:p>
+          <a:p>
+            <a:pPr lvl="1" marL="627529" indent="-294154" defTabSz="438150">
+              <a:spcBef>
+                <a:spcPts val="3100"/>
+              </a:spcBef>
+              <a:defRPr sz="1800"/>
+            </a:pPr>
+            <a:r>
+              <a:rPr sz="2250"/>
+              <a:t>Amicable numbers, merge sort, mandelbrot, dot product</a:t>
+            </a:r>
+            <a:endParaRPr b="1" sz="2250"/>
+          </a:p>
+          <a:p>
+            <a:pPr lvl="0" marL="294154" indent="-294154" defTabSz="438150">
+              <a:spcBef>
+                <a:spcPts val="3100"/>
+              </a:spcBef>
+              <a:defRPr sz="1800"/>
+            </a:pPr>
+            <a:r>
+              <a:rPr b="1" sz="2550"/>
+              <a:t>Suite</a:t>
+            </a:r>
+            <a:endParaRPr b="1" sz="2550"/>
+          </a:p>
+          <a:p>
+            <a:pPr lvl="1" marL="627529" indent="-294154" defTabSz="438150">
+              <a:spcBef>
+                <a:spcPts val="3100"/>
+              </a:spcBef>
+              <a:defRPr sz="1800"/>
+            </a:pPr>
+            <a:r>
+              <a:rPr sz="2250"/>
+              <a:t>Needleman-Wunsch (Bioinf.), SRAD (image processing), Particle Filter (medical imaging)  </a:t>
             </a:r>
           </a:p>
         </p:txBody>
@@ -2228,7 +2305,7 @@
             </a:pPr>
             <a:r>
               <a:rPr sz="8000"/>
-              <a:t>Progress</a:t>
+              <a:t>Workflow</a:t>
             </a:r>
           </a:p>
         </p:txBody>
@@ -2250,113 +2327,32 @@
           <a:bodyPr/>
           <a:lstStyle/>
           <a:p>
-            <a:pPr lvl="0" marL="400050" indent="-400050" defTabSz="525779">
-              <a:spcBef>
-                <a:spcPts val="3700"/>
-              </a:spcBef>
-              <a:defRPr sz="1800"/>
-            </a:pPr>
-            <a:r>
-              <a:rPr b="1" sz="3059"/>
-              <a:t>Stage 1 </a:t>
-            </a:r>
-            <a:endParaRPr sz="3059"/>
-          </a:p>
-          <a:p>
-            <a:pPr lvl="1" marL="800100" indent="-400050" defTabSz="525779">
-              <a:spcBef>
-                <a:spcPts val="3700"/>
-              </a:spcBef>
-              <a:defRPr sz="1800"/>
-            </a:pPr>
-            <a:r>
-              <a:rPr b="1" sz="3059"/>
-              <a:t>Sequential:</a:t>
-            </a:r>
-            <a:r>
-              <a:rPr sz="3059"/>
-              <a:t> implemented</a:t>
-            </a:r>
-            <a:endParaRPr sz="3059"/>
-          </a:p>
-          <a:p>
-            <a:pPr lvl="1" marL="800100" indent="-400050" defTabSz="525779">
-              <a:spcBef>
-                <a:spcPts val="3700"/>
-              </a:spcBef>
-              <a:defRPr sz="1800"/>
-            </a:pPr>
-            <a:r>
-              <a:rPr b="1" sz="3059"/>
-              <a:t>Micro:</a:t>
-            </a:r>
-            <a:r>
-              <a:rPr sz="3059"/>
-              <a:t> implemented</a:t>
-            </a:r>
-            <a:endParaRPr sz="3059"/>
-          </a:p>
-          <a:p>
-            <a:pPr lvl="0" marL="400050" indent="-400050" defTabSz="525779">
-              <a:spcBef>
-                <a:spcPts val="3700"/>
-              </a:spcBef>
-              <a:defRPr sz="1800"/>
-            </a:pPr>
-            <a:r>
-              <a:rPr b="1" sz="3059"/>
-              <a:t>Stage 2</a:t>
-            </a:r>
-            <a:endParaRPr sz="3059"/>
-          </a:p>
-          <a:p>
-            <a:pPr lvl="1" marL="800100" indent="-400050" defTabSz="525779">
-              <a:spcBef>
-                <a:spcPts val="3700"/>
-              </a:spcBef>
-              <a:defRPr sz="1800"/>
-            </a:pPr>
-            <a:r>
-              <a:rPr b="1" sz="3059"/>
-              <a:t>Component:</a:t>
-            </a:r>
-            <a:r>
-              <a:rPr sz="3059"/>
-              <a:t> halfway through</a:t>
-            </a:r>
-            <a:endParaRPr sz="3059"/>
-          </a:p>
-          <a:p>
-            <a:pPr lvl="1" marL="800100" indent="-400050" defTabSz="525779">
-              <a:spcBef>
-                <a:spcPts val="3700"/>
-              </a:spcBef>
-              <a:defRPr sz="1800"/>
-            </a:pPr>
-            <a:r>
-              <a:rPr b="1" sz="3059"/>
-              <a:t>Suite:</a:t>
-            </a:r>
-            <a:r>
-              <a:rPr sz="3059"/>
-              <a:t> only needs translation to Go</a:t>
-            </a:r>
-            <a:endParaRPr sz="3059"/>
-          </a:p>
-          <a:p>
-            <a:pPr lvl="0" marL="400050" indent="-400050" defTabSz="525779">
-              <a:spcBef>
-                <a:spcPts val="3700"/>
-              </a:spcBef>
-              <a:defRPr sz="1800"/>
-            </a:pPr>
-            <a:r>
-              <a:rPr b="1" sz="3059"/>
-              <a:t>Experiments:</a:t>
-            </a:r>
-            <a:r>
-              <a:rPr sz="3059"/>
-              <a:t> stage one done</a:t>
+            <a:pPr lvl="0">
+              <a:defRPr sz="1800"/>
+            </a:pPr>
+            <a:r>
+              <a:rPr sz="3400"/>
+              <a:t>Github</a:t>
+            </a:r>
+            <a:endParaRPr sz="3400"/>
+          </a:p>
+          <a:p>
+            <a:pPr lvl="0">
+              <a:defRPr sz="1800"/>
+            </a:pPr>
+            <a:r>
+              <a:rPr sz="3400"/>
+              <a:t>Focus on automation and incremental implementation</a:t>
+            </a:r>
+            <a:endParaRPr sz="3400"/>
+          </a:p>
+          <a:p>
+            <a:pPr lvl="0">
+              <a:defRPr sz="1800"/>
+            </a:pPr>
+            <a:r>
+              <a:rPr sz="3400"/>
+              <a:t>Issue -&gt; Implement on dev. branch -&gt; Push -&gt; Merge</a:t>
             </a:r>
           </a:p>
         </p:txBody>
@@ -2409,7 +2405,7 @@
             </a:pPr>
             <a:r>
               <a:rPr sz="8000"/>
-              <a:t>Next steps</a:t>
+              <a:t>Progress</a:t>
             </a:r>
           </a:p>
         </p:txBody>
@@ -2431,6 +2427,315 @@
           <a:bodyPr/>
           <a:lstStyle/>
           <a:p>
+            <a:pPr lvl="0" marL="400050" indent="-400050" defTabSz="525779">
+              <a:spcBef>
+                <a:spcPts val="3700"/>
+              </a:spcBef>
+              <a:defRPr sz="1800"/>
+            </a:pPr>
+            <a:r>
+              <a:rPr b="1" sz="3059"/>
+              <a:t>Stage 1 </a:t>
+            </a:r>
+            <a:endParaRPr sz="3059"/>
+          </a:p>
+          <a:p>
+            <a:pPr lvl="1" marL="800100" indent="-400050" defTabSz="525779">
+              <a:spcBef>
+                <a:spcPts val="3700"/>
+              </a:spcBef>
+              <a:defRPr sz="1800"/>
+            </a:pPr>
+            <a:r>
+              <a:rPr b="1" sz="3059"/>
+              <a:t>Sequential:</a:t>
+            </a:r>
+            <a:r>
+              <a:rPr sz="3059"/>
+              <a:t> implemented</a:t>
+            </a:r>
+            <a:endParaRPr sz="3059"/>
+          </a:p>
+          <a:p>
+            <a:pPr lvl="1" marL="800100" indent="-400050" defTabSz="525779">
+              <a:spcBef>
+                <a:spcPts val="3700"/>
+              </a:spcBef>
+              <a:defRPr sz="1800"/>
+            </a:pPr>
+            <a:r>
+              <a:rPr b="1" sz="3059"/>
+              <a:t>Micro:</a:t>
+            </a:r>
+            <a:r>
+              <a:rPr sz="3059"/>
+              <a:t> implemented</a:t>
+            </a:r>
+            <a:endParaRPr sz="3059"/>
+          </a:p>
+          <a:p>
+            <a:pPr lvl="0" marL="400050" indent="-400050" defTabSz="525779">
+              <a:spcBef>
+                <a:spcPts val="3700"/>
+              </a:spcBef>
+              <a:defRPr sz="1800"/>
+            </a:pPr>
+            <a:r>
+              <a:rPr b="1" sz="3059"/>
+              <a:t>Stage 2</a:t>
+            </a:r>
+            <a:endParaRPr sz="3059"/>
+          </a:p>
+          <a:p>
+            <a:pPr lvl="1" marL="800100" indent="-400050" defTabSz="525779">
+              <a:spcBef>
+                <a:spcPts val="3700"/>
+              </a:spcBef>
+              <a:defRPr sz="1800"/>
+            </a:pPr>
+            <a:r>
+              <a:rPr b="1" sz="3059"/>
+              <a:t>Component:</a:t>
+            </a:r>
+            <a:r>
+              <a:rPr sz="3059"/>
+              <a:t> halfway through</a:t>
+            </a:r>
+            <a:endParaRPr sz="3059"/>
+          </a:p>
+          <a:p>
+            <a:pPr lvl="1" marL="800100" indent="-400050" defTabSz="525779">
+              <a:spcBef>
+                <a:spcPts val="3700"/>
+              </a:spcBef>
+              <a:defRPr sz="1800"/>
+            </a:pPr>
+            <a:r>
+              <a:rPr b="1" sz="3059"/>
+              <a:t>Suite:</a:t>
+            </a:r>
+            <a:r>
+              <a:rPr sz="3059"/>
+              <a:t> only needs translation to Go</a:t>
+            </a:r>
+            <a:endParaRPr sz="3059"/>
+          </a:p>
+          <a:p>
+            <a:pPr lvl="0" marL="400050" indent="-400050" defTabSz="525779">
+              <a:spcBef>
+                <a:spcPts val="3700"/>
+              </a:spcBef>
+              <a:defRPr sz="1800"/>
+            </a:pPr>
+            <a:r>
+              <a:rPr b="1" sz="3059"/>
+              <a:t>Experiments:</a:t>
+            </a:r>
+            <a:r>
+              <a:rPr sz="3059"/>
+              <a:t> stage one done</a:t>
+            </a:r>
+          </a:p>
+        </p:txBody>
+      </p:sp>
+    </p:spTree>
+  </p:cSld>
+  <p:clrMapOvr>
+    <a:masterClrMapping/>
+  </p:clrMapOvr>
+  <p:transition spd="med" advClick="1"/>
+</p:sld>
+</file>
+
+<file path=ppt/slides/slide6.xml><?xml version="1.0" encoding="utf-8"?>
+<p:sld xmlns:a="http://schemas.openxmlformats.org/drawingml/2006/main" xmlns:r="http://schemas.openxmlformats.org/officeDocument/2006/relationships" xmlns:p="http://schemas.openxmlformats.org/presentationml/2006/main" showMasterSp="1" showMasterPhAnim="1">
+  <p:cSld>
+    <p:spTree>
+      <p:nvGrpSpPr>
+        <p:cNvPr id="1" name=""/>
+        <p:cNvGrpSpPr/>
+        <p:nvPr/>
+      </p:nvGrpSpPr>
+      <p:grpSpPr>
+        <a:xfrm>
+          <a:off x="0" y="0"/>
+          <a:ext cx="0" cy="0"/>
+          <a:chOff x="0" y="0"/>
+          <a:chExt cx="0" cy="0"/>
+        </a:xfrm>
+      </p:grpSpPr>
+      <p:sp>
+        <p:nvSpPr>
+          <p:cNvPr id="47" name="Shape 47"/>
+          <p:cNvSpPr/>
+          <p:nvPr>
+            <p:ph type="title"/>
+          </p:nvPr>
+        </p:nvSpPr>
+        <p:spPr>
+          <a:prstGeom prst="rect">
+            <a:avLst/>
+          </a:prstGeom>
+        </p:spPr>
+        <p:txBody>
+          <a:bodyPr/>
+          <a:lstStyle/>
+          <a:p>
+            <a:pPr lvl="0">
+              <a:defRPr sz="1800"/>
+            </a:pPr>
+            <a:r>
+              <a:rPr sz="8000"/>
+              <a:t>Ping-pong example</a:t>
+            </a:r>
+          </a:p>
+        </p:txBody>
+      </p:sp>
+      <p:sp>
+        <p:nvSpPr>
+          <p:cNvPr id="48" name="Shape 48"/>
+          <p:cNvSpPr/>
+          <p:nvPr>
+            <p:ph type="body" idx="1"/>
+          </p:nvPr>
+        </p:nvSpPr>
+        <p:spPr>
+          <a:prstGeom prst="rect">
+            <a:avLst/>
+          </a:prstGeom>
+        </p:spPr>
+        <p:txBody>
+          <a:bodyPr/>
+          <a:lstStyle/>
+          <a:p>
+            <a:pPr lvl="0"/>
+          </a:p>
+        </p:txBody>
+      </p:sp>
+      <p:pic>
+        <p:nvPicPr>
+          <p:cNvPr id="49" name="Skärmavbild 2014-07-01 kl. 20.46.09.png"/>
+          <p:cNvPicPr/>
+          <p:nvPr/>
+        </p:nvPicPr>
+        <p:blipFill>
+          <a:blip r:embed="rId2">
+            <a:extLst/>
+          </a:blip>
+          <a:stretch>
+            <a:fillRect/>
+          </a:stretch>
+        </p:blipFill>
+        <p:spPr>
+          <a:xfrm>
+            <a:off x="897185" y="2737154"/>
+            <a:ext cx="5709634" cy="6019192"/>
+          </a:xfrm>
+          <a:prstGeom prst="rect">
+            <a:avLst/>
+          </a:prstGeom>
+          <a:ln w="12700">
+            <a:miter lim="400000"/>
+          </a:ln>
+        </p:spPr>
+      </p:pic>
+      <p:pic>
+        <p:nvPicPr>
+          <p:cNvPr id="50" name="Skärmavbild 2014-07-01 kl. 20.47.09.png"/>
+          <p:cNvPicPr/>
+          <p:nvPr/>
+        </p:nvPicPr>
+        <p:blipFill>
+          <a:blip r:embed="rId3">
+            <a:extLst/>
+          </a:blip>
+          <a:stretch>
+            <a:fillRect/>
+          </a:stretch>
+        </p:blipFill>
+        <p:spPr>
+          <a:xfrm>
+            <a:off x="6313415" y="2737154"/>
+            <a:ext cx="5802211" cy="6019192"/>
+          </a:xfrm>
+          <a:prstGeom prst="rect">
+            <a:avLst/>
+          </a:prstGeom>
+          <a:ln w="12700">
+            <a:miter lim="400000"/>
+          </a:ln>
+        </p:spPr>
+      </p:pic>
+    </p:spTree>
+  </p:cSld>
+  <p:clrMapOvr>
+    <a:masterClrMapping/>
+  </p:clrMapOvr>
+  <p:transition spd="med" advClick="1"/>
+</p:sld>
+</file>
+
+<file path=ppt/slides/slide7.xml><?xml version="1.0" encoding="utf-8"?>
+<p:sld xmlns:a="http://schemas.openxmlformats.org/drawingml/2006/main" xmlns:r="http://schemas.openxmlformats.org/officeDocument/2006/relationships" xmlns:p="http://schemas.openxmlformats.org/presentationml/2006/main" showMasterSp="1" showMasterPhAnim="1">
+  <p:cSld>
+    <p:spTree>
+      <p:nvGrpSpPr>
+        <p:cNvPr id="1" name=""/>
+        <p:cNvGrpSpPr/>
+        <p:nvPr/>
+      </p:nvGrpSpPr>
+      <p:grpSpPr>
+        <a:xfrm>
+          <a:off x="0" y="0"/>
+          <a:ext cx="0" cy="0"/>
+          <a:chOff x="0" y="0"/>
+          <a:chExt cx="0" cy="0"/>
+        </a:xfrm>
+      </p:grpSpPr>
+      <p:sp>
+        <p:nvSpPr>
+          <p:cNvPr id="52" name="Shape 52"/>
+          <p:cNvSpPr/>
+          <p:nvPr>
+            <p:ph type="title"/>
+          </p:nvPr>
+        </p:nvSpPr>
+        <p:spPr>
+          <a:prstGeom prst="rect">
+            <a:avLst/>
+          </a:prstGeom>
+        </p:spPr>
+        <p:txBody>
+          <a:bodyPr/>
+          <a:lstStyle/>
+          <a:p>
+            <a:pPr lvl="0">
+              <a:defRPr sz="1800"/>
+            </a:pPr>
+            <a:r>
+              <a:rPr sz="8000"/>
+              <a:t>Next steps</a:t>
+            </a:r>
+          </a:p>
+        </p:txBody>
+      </p:sp>
+      <p:sp>
+        <p:nvSpPr>
+          <p:cNvPr id="53" name="Shape 53"/>
+          <p:cNvSpPr/>
+          <p:nvPr>
+            <p:ph type="body" idx="1"/>
+          </p:nvPr>
+        </p:nvSpPr>
+        <p:spPr>
+          <a:prstGeom prst="rect">
+            <a:avLst/>
+          </a:prstGeom>
+        </p:spPr>
+        <p:txBody>
+          <a:bodyPr/>
+          <a:lstStyle/>
+          <a:p>
             <a:pPr lvl="0">
               <a:defRPr sz="1800"/>
             </a:pPr>
@@ -2489,6 +2794,138 @@
             <a:r>
               <a:rPr sz="3400"/>
               <a:t>run second set of experiments</a:t>
+            </a:r>
+          </a:p>
+        </p:txBody>
+      </p:sp>
+    </p:spTree>
+  </p:cSld>
+  <p:clrMapOvr>
+    <a:masterClrMapping/>
+  </p:clrMapOvr>
+  <p:transition spd="med" advClick="1"/>
+</p:sld>
+</file>
+
+<file path=ppt/slides/slide8.xml><?xml version="1.0" encoding="utf-8"?>
+<p:sld xmlns:a="http://schemas.openxmlformats.org/drawingml/2006/main" xmlns:r="http://schemas.openxmlformats.org/officeDocument/2006/relationships" xmlns:p="http://schemas.openxmlformats.org/presentationml/2006/main" showMasterSp="1" showMasterPhAnim="1">
+  <p:cSld>
+    <p:spTree>
+      <p:nvGrpSpPr>
+        <p:cNvPr id="1" name=""/>
+        <p:cNvGrpSpPr/>
+        <p:nvPr/>
+      </p:nvGrpSpPr>
+      <p:grpSpPr>
+        <a:xfrm>
+          <a:off x="0" y="0"/>
+          <a:ext cx="0" cy="0"/>
+          <a:chOff x="0" y="0"/>
+          <a:chExt cx="0" cy="0"/>
+        </a:xfrm>
+      </p:grpSpPr>
+      <p:sp>
+        <p:nvSpPr>
+          <p:cNvPr id="55" name="Shape 55"/>
+          <p:cNvSpPr/>
+          <p:nvPr>
+            <p:ph type="title"/>
+          </p:nvPr>
+        </p:nvSpPr>
+        <p:spPr>
+          <a:prstGeom prst="rect">
+            <a:avLst/>
+          </a:prstGeom>
+        </p:spPr>
+        <p:txBody>
+          <a:bodyPr/>
+          <a:lstStyle/>
+          <a:p>
+            <a:pPr lvl="0">
+              <a:defRPr sz="1800"/>
+            </a:pPr>
+            <a:r>
+              <a:rPr sz="8000"/>
+              <a:t>Timeline</a:t>
+            </a:r>
+          </a:p>
+        </p:txBody>
+      </p:sp>
+      <p:sp>
+        <p:nvSpPr>
+          <p:cNvPr id="56" name="Shape 56"/>
+          <p:cNvSpPr/>
+          <p:nvPr>
+            <p:ph type="body" idx="1"/>
+          </p:nvPr>
+        </p:nvSpPr>
+        <p:spPr>
+          <a:prstGeom prst="rect">
+            <a:avLst/>
+          </a:prstGeom>
+        </p:spPr>
+        <p:txBody>
+          <a:bodyPr/>
+          <a:lstStyle/>
+          <a:p>
+            <a:pPr lvl="0">
+              <a:defRPr sz="1800"/>
+            </a:pPr>
+            <a:r>
+              <a:rPr sz="3400"/>
+              <a:t>No deadlines, but rough timeline from IRP:</a:t>
+            </a:r>
+            <a:endParaRPr sz="3400"/>
+          </a:p>
+          <a:p>
+            <a:pPr lvl="1">
+              <a:defRPr sz="1800"/>
+            </a:pPr>
+            <a:r>
+              <a:rPr b="1" sz="3400"/>
+              <a:t>July 15th: </a:t>
+            </a:r>
+            <a:r>
+              <a:rPr sz="3400"/>
+              <a:t>Component benchmarks implemented</a:t>
+            </a:r>
+            <a:endParaRPr sz="3400"/>
+          </a:p>
+          <a:p>
+            <a:pPr lvl="1">
+              <a:defRPr sz="1800"/>
+            </a:pPr>
+            <a:r>
+              <a:rPr b="1" sz="3400"/>
+              <a:t>August 1st: </a:t>
+            </a:r>
+            <a:r>
+              <a:rPr sz="3400"/>
+              <a:t>Suite algorithms implemented </a:t>
+            </a:r>
+            <a:endParaRPr sz="3400"/>
+          </a:p>
+          <a:p>
+            <a:pPr lvl="1">
+              <a:defRPr sz="1800"/>
+            </a:pPr>
+            <a:r>
+              <a:rPr b="1" sz="3400"/>
+              <a:t>August 5th: </a:t>
+            </a:r>
+            <a:r>
+              <a:rPr sz="3400"/>
+              <a:t>Analysis of results done</a:t>
+            </a:r>
+            <a:endParaRPr sz="3400"/>
+          </a:p>
+          <a:p>
+            <a:pPr lvl="1">
+              <a:defRPr sz="1800"/>
+            </a:pPr>
+            <a:r>
+              <a:rPr sz="3400"/>
+              <a:t>Plotting of results and writing done incrementally and concurrently with implementation</a:t>
             </a:r>
           </a:p>
         </p:txBody>

</xml_diff>

<commit_message>
removed ping-pong.c from presentation
</commit_message>
<xml_diff>
--- a/presentation/presentation.pptx
+++ b/presentation/presentation.pptx
@@ -2614,7 +2614,7 @@
       </p:sp>
       <p:pic>
         <p:nvPicPr>
-          <p:cNvPr id="49" name="Skärmavbild 2014-07-01 kl. 20.46.09.png"/>
+          <p:cNvPr id="49" name="Skärmavbild 2014-07-01 kl. 20.47.09.png"/>
           <p:cNvPicPr/>
           <p:nvPr/>
         </p:nvPicPr>
@@ -2628,35 +2628,8 @@
         </p:blipFill>
         <p:spPr>
           <a:xfrm>
-            <a:off x="897185" y="2737154"/>
-            <a:ext cx="5709634" cy="6019192"/>
-          </a:xfrm>
-          <a:prstGeom prst="rect">
-            <a:avLst/>
-          </a:prstGeom>
-          <a:ln w="12700">
-            <a:miter lim="400000"/>
-          </a:ln>
-        </p:spPr>
-      </p:pic>
-      <p:pic>
-        <p:nvPicPr>
-          <p:cNvPr id="50" name="Skärmavbild 2014-07-01 kl. 20.47.09.png"/>
-          <p:cNvPicPr/>
-          <p:nvPr/>
-        </p:nvPicPr>
-        <p:blipFill>
-          <a:blip r:embed="rId3">
-            <a:extLst/>
-          </a:blip>
-          <a:stretch>
-            <a:fillRect/>
-          </a:stretch>
-        </p:blipFill>
-        <p:spPr>
-          <a:xfrm>
-            <a:off x="6313415" y="2737154"/>
-            <a:ext cx="5802211" cy="6019192"/>
+            <a:off x="3385071" y="2512844"/>
+            <a:ext cx="6234658" cy="6467812"/>
           </a:xfrm>
           <a:prstGeom prst="rect">
             <a:avLst/>
@@ -2694,7 +2667,7 @@
       </p:grpSpPr>
       <p:sp>
         <p:nvSpPr>
-          <p:cNvPr id="52" name="Shape 52"/>
+          <p:cNvPr id="51" name="Shape 51"/>
           <p:cNvSpPr/>
           <p:nvPr>
             <p:ph type="title"/>
@@ -2721,7 +2694,7 @@
       </p:sp>
       <p:sp>
         <p:nvSpPr>
-          <p:cNvPr id="53" name="Shape 53"/>
+          <p:cNvPr id="52" name="Shape 52"/>
           <p:cNvSpPr/>
           <p:nvPr>
             <p:ph type="body" idx="1"/>
@@ -2826,7 +2799,7 @@
       </p:grpSpPr>
       <p:sp>
         <p:nvSpPr>
-          <p:cNvPr id="55" name="Shape 55"/>
+          <p:cNvPr id="54" name="Shape 54"/>
           <p:cNvSpPr/>
           <p:nvPr>
             <p:ph type="title"/>
@@ -2853,7 +2826,7 @@
       </p:sp>
       <p:sp>
         <p:nvSpPr>
-          <p:cNvPr id="56" name="Shape 56"/>
+          <p:cNvPr id="55" name="Shape 55"/>
           <p:cNvSpPr/>
           <p:nvPr>
             <p:ph type="body" idx="1"/>

</xml_diff>